<commit_message>
Updated citations; formatted for PLoS ONE; moved textbox in methods (not allowed); removed supplemntal table 2 (not updated; too late to fix)
git-svn-id: http://svn.code.sf.net/p/obi/code@4024 a3e8fd31-a726-0410-8195-c3f0c8a19530
</commit_message>
<xml_diff>
--- a/trunk/docs/papers/release/2015 PLoS ONE submission/Figure 3.pptx
+++ b/trunk/docs/papers/release/2015 PLoS ONE submission/Figure 3.pptx
@@ -289,7 +289,7 @@
           <a:p>
             <a:fld id="{8057F8A9-5EBF-4A91-9B97-1BE2DF33FEFB}" type="datetimeFigureOut">
               <a:rPr lang="en-US" smtClean="0"/>
-              <a:t>11/9/2015</a:t>
+              <a:t>12/11/2015</a:t>
             </a:fld>
             <a:endParaRPr lang="en-US"/>
           </a:p>
@@ -459,7 +459,7 @@
           <a:p>
             <a:fld id="{8057F8A9-5EBF-4A91-9B97-1BE2DF33FEFB}" type="datetimeFigureOut">
               <a:rPr lang="en-US" smtClean="0"/>
-              <a:t>11/9/2015</a:t>
+              <a:t>12/11/2015</a:t>
             </a:fld>
             <a:endParaRPr lang="en-US"/>
           </a:p>
@@ -639,7 +639,7 @@
           <a:p>
             <a:fld id="{8057F8A9-5EBF-4A91-9B97-1BE2DF33FEFB}" type="datetimeFigureOut">
               <a:rPr lang="en-US" smtClean="0"/>
-              <a:t>11/9/2015</a:t>
+              <a:t>12/11/2015</a:t>
             </a:fld>
             <a:endParaRPr lang="en-US"/>
           </a:p>
@@ -809,7 +809,7 @@
           <a:p>
             <a:fld id="{8057F8A9-5EBF-4A91-9B97-1BE2DF33FEFB}" type="datetimeFigureOut">
               <a:rPr lang="en-US" smtClean="0"/>
-              <a:t>11/9/2015</a:t>
+              <a:t>12/11/2015</a:t>
             </a:fld>
             <a:endParaRPr lang="en-US"/>
           </a:p>
@@ -1055,7 +1055,7 @@
           <a:p>
             <a:fld id="{8057F8A9-5EBF-4A91-9B97-1BE2DF33FEFB}" type="datetimeFigureOut">
               <a:rPr lang="en-US" smtClean="0"/>
-              <a:t>11/9/2015</a:t>
+              <a:t>12/11/2015</a:t>
             </a:fld>
             <a:endParaRPr lang="en-US"/>
           </a:p>
@@ -1343,7 +1343,7 @@
           <a:p>
             <a:fld id="{8057F8A9-5EBF-4A91-9B97-1BE2DF33FEFB}" type="datetimeFigureOut">
               <a:rPr lang="en-US" smtClean="0"/>
-              <a:t>11/9/2015</a:t>
+              <a:t>12/11/2015</a:t>
             </a:fld>
             <a:endParaRPr lang="en-US"/>
           </a:p>
@@ -1765,7 +1765,7 @@
           <a:p>
             <a:fld id="{8057F8A9-5EBF-4A91-9B97-1BE2DF33FEFB}" type="datetimeFigureOut">
               <a:rPr lang="en-US" smtClean="0"/>
-              <a:t>11/9/2015</a:t>
+              <a:t>12/11/2015</a:t>
             </a:fld>
             <a:endParaRPr lang="en-US"/>
           </a:p>
@@ -1883,7 +1883,7 @@
           <a:p>
             <a:fld id="{8057F8A9-5EBF-4A91-9B97-1BE2DF33FEFB}" type="datetimeFigureOut">
               <a:rPr lang="en-US" smtClean="0"/>
-              <a:t>11/9/2015</a:t>
+              <a:t>12/11/2015</a:t>
             </a:fld>
             <a:endParaRPr lang="en-US"/>
           </a:p>
@@ -1978,7 +1978,7 @@
           <a:p>
             <a:fld id="{8057F8A9-5EBF-4A91-9B97-1BE2DF33FEFB}" type="datetimeFigureOut">
               <a:rPr lang="en-US" smtClean="0"/>
-              <a:t>11/9/2015</a:t>
+              <a:t>12/11/2015</a:t>
             </a:fld>
             <a:endParaRPr lang="en-US"/>
           </a:p>
@@ -2255,7 +2255,7 @@
           <a:p>
             <a:fld id="{8057F8A9-5EBF-4A91-9B97-1BE2DF33FEFB}" type="datetimeFigureOut">
               <a:rPr lang="en-US" smtClean="0"/>
-              <a:t>11/9/2015</a:t>
+              <a:t>12/11/2015</a:t>
             </a:fld>
             <a:endParaRPr lang="en-US"/>
           </a:p>
@@ -2508,7 +2508,7 @@
           <a:p>
             <a:fld id="{8057F8A9-5EBF-4A91-9B97-1BE2DF33FEFB}" type="datetimeFigureOut">
               <a:rPr lang="en-US" smtClean="0"/>
-              <a:t>11/9/2015</a:t>
+              <a:t>12/11/2015</a:t>
             </a:fld>
             <a:endParaRPr lang="en-US"/>
           </a:p>
@@ -2721,7 +2721,7 @@
           <a:p>
             <a:fld id="{8057F8A9-5EBF-4A91-9B97-1BE2DF33FEFB}" type="datetimeFigureOut">
               <a:rPr lang="en-US" smtClean="0"/>
-              <a:t>11/9/2015</a:t>
+              <a:t>12/11/2015</a:t>
             </a:fld>
             <a:endParaRPr lang="en-US"/>
           </a:p>
@@ -3376,7 +3376,6 @@
               <a:rPr lang="en-US" sz="1200" dirty="0"/>
               <a:t>)</a:t>
             </a:r>
-            <a:endParaRPr lang="en-US" sz="1200" dirty="0"/>
           </a:p>
         </p:txBody>
       </p:sp>
@@ -3870,44 +3869,6 @@
           <a:chExt cx="0" cy="0"/>
         </a:xfrm>
       </p:grpSpPr>
-      <p:sp>
-        <p:nvSpPr>
-          <p:cNvPr id="2" name="Title 1"/>
-          <p:cNvSpPr>
-            <a:spLocks noGrp="1"/>
-          </p:cNvSpPr>
-          <p:nvPr>
-            <p:ph type="title"/>
-          </p:nvPr>
-        </p:nvSpPr>
-        <p:spPr/>
-        <p:txBody>
-          <a:bodyPr/>
-          <a:lstStyle/>
-          <a:p>
-            <a:endParaRPr lang="en-US"/>
-          </a:p>
-        </p:txBody>
-      </p:sp>
-      <p:sp>
-        <p:nvSpPr>
-          <p:cNvPr id="3" name="Content Placeholder 2"/>
-          <p:cNvSpPr>
-            <a:spLocks noGrp="1"/>
-          </p:cNvSpPr>
-          <p:nvPr>
-            <p:ph idx="1"/>
-          </p:nvPr>
-        </p:nvSpPr>
-        <p:spPr/>
-        <p:txBody>
-          <a:bodyPr/>
-          <a:lstStyle/>
-          <a:p>
-            <a:endParaRPr lang="en-US" dirty="0"/>
-          </a:p>
-        </p:txBody>
-      </p:sp>
       <p:pic>
         <p:nvPicPr>
           <p:cNvPr id="1026" name="Picture 2"/>

</xml_diff>